<commit_message>
Make Time Shift more accurate to theory
Also changed the last future row of Time Difference.
</commit_message>
<xml_diff>
--- a/Vega Presentation Slides.pptx
+++ b/Vega Presentation Slides.pptx
@@ -12,7 +12,7 @@
     <p:sldId id="256" r:id="rId3"/>
     <p:sldId id="262" r:id="rId4"/>
     <p:sldId id="263" r:id="rId5"/>
-    <p:sldId id="264" r:id="rId6"/>
+    <p:sldId id="265" r:id="rId6"/>
     <p:sldId id="257" r:id="rId7"/>
     <p:sldId id="259" r:id="rId8"/>
   </p:sldIdLst>
@@ -3475,7 +3475,7 @@
           <p:nvPr>
             <p:extLst>
               <p:ext uri="{D42A27DB-BD31-4B8C-83A1-F6EECF244321}">
-                <p14:modId xmlns:p14="http://schemas.microsoft.com/office/powerpoint/2010/main" val="2256712593"/>
+                <p14:modId xmlns:p14="http://schemas.microsoft.com/office/powerpoint/2010/main" val="606115314"/>
               </p:ext>
             </p:extLst>
           </p:nvPr>
@@ -3626,7 +3626,7 @@
                           <a:latin typeface="Times New Roman" panose="02020603050405020304" pitchFamily="18" charset="0"/>
                           <a:cs typeface="Times New Roman" panose="02020603050405020304" pitchFamily="18" charset="0"/>
                         </a:rPr>
-                        <a:t>Density.2</a:t>
+                        <a:t>Density.1</a:t>
                       </a:r>
                     </a:p>
                   </a:txBody>
@@ -3688,7 +3688,7 @@
                           <a:latin typeface="Times New Roman" panose="02020603050405020304" pitchFamily="18" charset="0"/>
                           <a:cs typeface="Times New Roman" panose="02020603050405020304" pitchFamily="18" charset="0"/>
                         </a:rPr>
-                        <a:t>Density.1</a:t>
+                        <a:t>Density.0</a:t>
                       </a:r>
                     </a:p>
                   </a:txBody>
@@ -3766,7 +3766,7 @@
                           <a:latin typeface="Times New Roman" panose="02020603050405020304" pitchFamily="18" charset="0"/>
                           <a:cs typeface="Times New Roman" panose="02020603050405020304" pitchFamily="18" charset="0"/>
                         </a:rPr>
-                        <a:t>Density.3</a:t>
+                        <a:t>Density.2</a:t>
                       </a:r>
                     </a:p>
                   </a:txBody>
@@ -4142,7 +4142,7 @@
                           <a:latin typeface="Times New Roman" panose="02020603050405020304" pitchFamily="18" charset="0"/>
                           <a:cs typeface="Times New Roman" panose="02020603050405020304" pitchFamily="18" charset="0"/>
                         </a:rPr>
-                        <a:t>1.3588403</a:t>
+                        <a:t>…</a:t>
                       </a:r>
                     </a:p>
                   </a:txBody>
@@ -4169,9 +4169,7 @@
                       <a:tailEnd type="none" w="med" len="med"/>
                     </a:lnT>
                     <a:lnB w="12700" cap="flat" cmpd="sng" algn="ctr">
-                      <a:solidFill>
-                        <a:srgbClr val="591D91"/>
-                      </a:solidFill>
+                      <a:noFill/>
                       <a:prstDash val="solid"/>
                       <a:round/>
                       <a:headEnd type="none" w="med" len="med"/>
@@ -4206,7 +4204,7 @@
                           <a:latin typeface="Times New Roman" panose="02020603050405020304" pitchFamily="18" charset="0"/>
                           <a:cs typeface="Times New Roman" panose="02020603050405020304" pitchFamily="18" charset="0"/>
                         </a:rPr>
-                        <a:t>…</a:t>
+                        <a:t>1.1023268</a:t>
                       </a:r>
                     </a:p>
                   </a:txBody>
@@ -4268,7 +4266,7 @@
                           <a:latin typeface="Times New Roman" panose="02020603050405020304" pitchFamily="18" charset="0"/>
                           <a:cs typeface="Times New Roman" panose="02020603050405020304" pitchFamily="18" charset="0"/>
                         </a:rPr>
-                        <a:t>…</a:t>
+                        <a:t>1.3588403</a:t>
                       </a:r>
                     </a:p>
                   </a:txBody>
@@ -4295,7 +4293,9 @@
                       <a:tailEnd type="none" w="med" len="med"/>
                     </a:lnT>
                     <a:lnB w="12700" cap="flat" cmpd="sng" algn="ctr">
-                      <a:noFill/>
+                      <a:solidFill>
+                        <a:srgbClr val="591D91"/>
+                      </a:solidFill>
                       <a:prstDash val="solid"/>
                       <a:round/>
                       <a:headEnd type="none" w="med" len="med"/>
@@ -4350,6 +4350,126 @@
                       <a:tailEnd type="none" w="med" len="med"/>
                     </a:lnL>
                     <a:lnR w="12700" cap="flat" cmpd="sng" algn="ctr">
+                      <a:noFill/>
+                      <a:prstDash val="solid"/>
+                      <a:round/>
+                      <a:headEnd type="none" w="med" len="med"/>
+                      <a:tailEnd type="none" w="med" len="med"/>
+                    </a:lnR>
+                    <a:lnT w="12700" cap="flat" cmpd="sng" algn="ctr">
+                      <a:noFill/>
+                      <a:prstDash val="solid"/>
+                      <a:round/>
+                      <a:headEnd type="none" w="med" len="med"/>
+                      <a:tailEnd type="none" w="med" len="med"/>
+                    </a:lnT>
+                    <a:lnB w="12700" cap="flat" cmpd="sng" algn="ctr">
+                      <a:noFill/>
+                      <a:prstDash val="solid"/>
+                      <a:round/>
+                      <a:headEnd type="none" w="med" len="med"/>
+                      <a:tailEnd type="none" w="med" len="med"/>
+                    </a:lnB>
+                    <a:lnTlToBr w="12700" cmpd="sng">
+                      <a:noFill/>
+                      <a:prstDash val="solid"/>
+                    </a:lnTlToBr>
+                    <a:lnBlToTr w="12700" cmpd="sng">
+                      <a:noFill/>
+                      <a:prstDash val="solid"/>
+                    </a:lnBlToTr>
+                    <a:noFill/>
+                  </a:tcPr>
+                </a:tc>
+                <a:tc>
+                  <a:txBody>
+                    <a:bodyPr/>
+                    <a:lstStyle/>
+                    <a:p>
+                      <a:pPr algn="ctr"/>
+                      <a:r>
+                        <a:rPr lang="en-US" sz="1700" b="0" dirty="0">
+                          <a:solidFill>
+                            <a:schemeClr val="bg1">
+                              <a:lumMod val="75000"/>
+                            </a:schemeClr>
+                          </a:solidFill>
+                          <a:latin typeface="Times New Roman" panose="02020603050405020304" pitchFamily="18" charset="0"/>
+                          <a:cs typeface="Times New Roman" panose="02020603050405020304" pitchFamily="18" charset="0"/>
+                        </a:rPr>
+                        <a:t>1.1023268</a:t>
+                      </a:r>
+                    </a:p>
+                  </a:txBody>
+                  <a:tcPr marL="0" marR="0" marT="0" marB="0" anchor="ctr">
+                    <a:lnL w="12700" cap="flat" cmpd="sng" algn="ctr">
+                      <a:noFill/>
+                      <a:prstDash val="solid"/>
+                      <a:round/>
+                      <a:headEnd type="none" w="med" len="med"/>
+                      <a:tailEnd type="none" w="med" len="med"/>
+                    </a:lnL>
+                    <a:lnR w="12700" cap="flat" cmpd="sng" algn="ctr">
+                      <a:noFill/>
+                      <a:prstDash val="solid"/>
+                      <a:round/>
+                      <a:headEnd type="none" w="med" len="med"/>
+                      <a:tailEnd type="none" w="med" len="med"/>
+                    </a:lnR>
+                    <a:lnT w="12700" cap="flat" cmpd="sng" algn="ctr">
+                      <a:noFill/>
+                      <a:prstDash val="solid"/>
+                      <a:round/>
+                      <a:headEnd type="none" w="med" len="med"/>
+                      <a:tailEnd type="none" w="med" len="med"/>
+                    </a:lnT>
+                    <a:lnB w="12700" cap="flat" cmpd="sng" algn="ctr">
+                      <a:noFill/>
+                      <a:prstDash val="solid"/>
+                      <a:round/>
+                      <a:headEnd type="none" w="med" len="med"/>
+                      <a:tailEnd type="none" w="med" len="med"/>
+                    </a:lnB>
+                    <a:lnTlToBr w="12700" cmpd="sng">
+                      <a:noFill/>
+                      <a:prstDash val="solid"/>
+                    </a:lnTlToBr>
+                    <a:lnBlToTr w="12700" cmpd="sng">
+                      <a:noFill/>
+                      <a:prstDash val="solid"/>
+                    </a:lnBlToTr>
+                    <a:noFill/>
+                  </a:tcPr>
+                </a:tc>
+                <a:tc>
+                  <a:txBody>
+                    <a:bodyPr/>
+                    <a:lstStyle/>
+                    <a:p>
+                      <a:pPr algn="ctr"/>
+                      <a:r>
+                        <a:rPr lang="en-US" sz="1700" b="0" dirty="0">
+                          <a:solidFill>
+                            <a:schemeClr val="bg1">
+                              <a:lumMod val="75000"/>
+                            </a:schemeClr>
+                          </a:solidFill>
+                          <a:latin typeface="Times New Roman" panose="02020603050405020304" pitchFamily="18" charset="0"/>
+                          <a:cs typeface="Times New Roman" panose="02020603050405020304" pitchFamily="18" charset="0"/>
+                        </a:rPr>
+                        <a:t>1.3588403</a:t>
+                      </a:r>
+                    </a:p>
+                  </a:txBody>
+                  <a:tcPr marL="0" marR="0" marT="0" marB="0" anchor="ctr">
+                    <a:lnL w="12700" cap="flat" cmpd="sng" algn="ctr">
+                      <a:noFill/>
+                      <a:prstDash val="solid"/>
+                      <a:round/>
+                      <a:headEnd type="none" w="med" len="med"/>
+                      <a:tailEnd type="none" w="med" len="med"/>
+                    </a:lnL>
+                    <a:lnR w="12700" cap="flat" cmpd="sng" algn="ctr">
                       <a:solidFill>
                         <a:srgbClr val="591D91"/>
                       </a:solidFill>
@@ -4366,7 +4486,9 @@
                       <a:tailEnd type="none" w="med" len="med"/>
                     </a:lnT>
                     <a:lnB w="12700" cap="flat" cmpd="sng" algn="ctr">
-                      <a:noFill/>
+                      <a:solidFill>
+                        <a:srgbClr val="591D91"/>
+                      </a:solidFill>
                       <a:prstDash val="solid"/>
                       <a:round/>
                       <a:headEnd type="none" w="med" len="med"/>
@@ -4465,130 +4587,6 @@
                     <a:noFill/>
                   </a:tcPr>
                 </a:tc>
-                <a:tc>
-                  <a:txBody>
-                    <a:bodyPr/>
-                    <a:lstStyle/>
-                    <a:p>
-                      <a:pPr algn="ctr"/>
-                      <a:r>
-                        <a:rPr lang="en-US" sz="1700" b="0" dirty="0">
-                          <a:solidFill>
-                            <a:schemeClr val="bg1">
-                              <a:lumMod val="75000"/>
-                            </a:schemeClr>
-                          </a:solidFill>
-                          <a:latin typeface="Times New Roman" panose="02020603050405020304" pitchFamily="18" charset="0"/>
-                          <a:cs typeface="Times New Roman" panose="02020603050405020304" pitchFamily="18" charset="0"/>
-                        </a:rPr>
-                        <a:t>1.3588403</a:t>
-                      </a:r>
-                    </a:p>
-                  </a:txBody>
-                  <a:tcPr marL="0" marR="0" marT="0" marB="0" anchor="ctr">
-                    <a:lnL w="12700" cap="flat" cmpd="sng" algn="ctr">
-                      <a:solidFill>
-                        <a:srgbClr val="591D91"/>
-                      </a:solidFill>
-                      <a:prstDash val="solid"/>
-                      <a:round/>
-                      <a:headEnd type="none" w="med" len="med"/>
-                      <a:tailEnd type="none" w="med" len="med"/>
-                    </a:lnL>
-                    <a:lnR w="12700" cap="flat" cmpd="sng" algn="ctr">
-                      <a:noFill/>
-                      <a:prstDash val="solid"/>
-                      <a:round/>
-                      <a:headEnd type="none" w="med" len="med"/>
-                      <a:tailEnd type="none" w="med" len="med"/>
-                    </a:lnR>
-                    <a:lnT w="12700" cap="flat" cmpd="sng" algn="ctr">
-                      <a:noFill/>
-                      <a:prstDash val="solid"/>
-                      <a:round/>
-                      <a:headEnd type="none" w="med" len="med"/>
-                      <a:tailEnd type="none" w="med" len="med"/>
-                    </a:lnT>
-                    <a:lnB w="12700" cap="flat" cmpd="sng" algn="ctr">
-                      <a:solidFill>
-                        <a:srgbClr val="591D91"/>
-                      </a:solidFill>
-                      <a:prstDash val="solid"/>
-                      <a:round/>
-                      <a:headEnd type="none" w="med" len="med"/>
-                      <a:tailEnd type="none" w="med" len="med"/>
-                    </a:lnB>
-                    <a:lnTlToBr w="12700" cmpd="sng">
-                      <a:noFill/>
-                      <a:prstDash val="solid"/>
-                    </a:lnTlToBr>
-                    <a:lnBlToTr w="12700" cmpd="sng">
-                      <a:noFill/>
-                      <a:prstDash val="solid"/>
-                    </a:lnBlToTr>
-                    <a:noFill/>
-                  </a:tcPr>
-                </a:tc>
-                <a:tc>
-                  <a:txBody>
-                    <a:bodyPr/>
-                    <a:lstStyle/>
-                    <a:p>
-                      <a:pPr algn="ctr"/>
-                      <a:r>
-                        <a:rPr lang="en-US" sz="1700" b="0" dirty="0">
-                          <a:solidFill>
-                            <a:schemeClr val="bg1">
-                              <a:lumMod val="75000"/>
-                            </a:schemeClr>
-                          </a:solidFill>
-                          <a:latin typeface="Times New Roman" panose="02020603050405020304" pitchFamily="18" charset="0"/>
-                          <a:cs typeface="Times New Roman" panose="02020603050405020304" pitchFamily="18" charset="0"/>
-                        </a:rPr>
-                        <a:t>…</a:t>
-                      </a:r>
-                    </a:p>
-                  </a:txBody>
-                  <a:tcPr marL="0" marR="0" marT="0" marB="0" anchor="ctr">
-                    <a:lnL w="12700" cap="flat" cmpd="sng" algn="ctr">
-                      <a:noFill/>
-                      <a:prstDash val="solid"/>
-                      <a:round/>
-                      <a:headEnd type="none" w="med" len="med"/>
-                      <a:tailEnd type="none" w="med" len="med"/>
-                    </a:lnL>
-                    <a:lnR w="12700" cap="flat" cmpd="sng" algn="ctr">
-                      <a:noFill/>
-                      <a:prstDash val="solid"/>
-                      <a:round/>
-                      <a:headEnd type="none" w="med" len="med"/>
-                      <a:tailEnd type="none" w="med" len="med"/>
-                    </a:lnR>
-                    <a:lnT w="12700" cap="flat" cmpd="sng" algn="ctr">
-                      <a:noFill/>
-                      <a:prstDash val="solid"/>
-                      <a:round/>
-                      <a:headEnd type="none" w="med" len="med"/>
-                      <a:tailEnd type="none" w="med" len="med"/>
-                    </a:lnT>
-                    <a:lnB w="12700" cap="flat" cmpd="sng" algn="ctr">
-                      <a:noFill/>
-                      <a:prstDash val="solid"/>
-                      <a:round/>
-                      <a:headEnd type="none" w="med" len="med"/>
-                      <a:tailEnd type="none" w="med" len="med"/>
-                    </a:lnB>
-                    <a:lnTlToBr w="12700" cmpd="sng">
-                      <a:noFill/>
-                      <a:prstDash val="solid"/>
-                    </a:lnTlToBr>
-                    <a:lnBlToTr w="12700" cmpd="sng">
-                      <a:noFill/>
-                      <a:prstDash val="solid"/>
-                    </a:lnBlToTr>
-                    <a:noFill/>
-                  </a:tcPr>
-                </a:tc>
                 <a:extLst>
                   <a:ext uri="{0D108BD9-81ED-4DB2-BD59-A6C34878D82A}">
                     <a16:rowId xmlns:a16="http://schemas.microsoft.com/office/drawing/2014/main" val="4273360853"/>
@@ -4661,7 +4659,23 @@
                     <a:bodyPr/>
                     <a:lstStyle/>
                     <a:p>
-                      <a:pPr algn="ctr"/>
+                      <a:pPr marL="0" marR="0" lvl="0" indent="0" algn="ctr" defTabSz="914400" rtl="0" eaLnBrk="1" fontAlgn="auto" latinLnBrk="0" hangingPunct="1">
+                        <a:lnSpc>
+                          <a:spcPct val="100000"/>
+                        </a:lnSpc>
+                        <a:spcBef>
+                          <a:spcPts val="0"/>
+                        </a:spcBef>
+                        <a:spcAft>
+                          <a:spcPts val="0"/>
+                        </a:spcAft>
+                        <a:buClrTx/>
+                        <a:buSzTx/>
+                        <a:buFontTx/>
+                        <a:buNone/>
+                        <a:tabLst/>
+                        <a:defRPr/>
+                      </a:pPr>
                       <a:r>
                         <a:rPr lang="en-US" sz="1700" b="0" dirty="0">
                           <a:solidFill>
@@ -4670,7 +4684,7 @@
                           <a:latin typeface="Times New Roman" panose="02020603050405020304" pitchFamily="18" charset="0"/>
                           <a:cs typeface="Times New Roman" panose="02020603050405020304" pitchFamily="18" charset="0"/>
                         </a:rPr>
-                        <a:t>1.5180655</a:t>
+                        <a:t>1.3588403</a:t>
                       </a:r>
                     </a:p>
                   </a:txBody>
@@ -4692,16 +4706,16 @@
                       <a:tailEnd type="none" w="med" len="med"/>
                     </a:lnR>
                     <a:lnT w="12700" cap="flat" cmpd="sng" algn="ctr">
+                      <a:noFill/>
+                      <a:prstDash val="solid"/>
+                      <a:round/>
+                      <a:headEnd type="none" w="med" len="med"/>
+                      <a:tailEnd type="none" w="med" len="med"/>
+                    </a:lnT>
+                    <a:lnB w="12700" cap="flat" cmpd="sng" algn="ctr">
                       <a:solidFill>
                         <a:srgbClr val="591D91"/>
                       </a:solidFill>
-                      <a:prstDash val="solid"/>
-                      <a:round/>
-                      <a:headEnd type="none" w="med" len="med"/>
-                      <a:tailEnd type="none" w="med" len="med"/>
-                    </a:lnT>
-                    <a:lnB w="12700" cap="flat" cmpd="sng" algn="ctr">
-                      <a:noFill/>
                       <a:prstDash val="solid"/>
                       <a:round/>
                       <a:headEnd type="none" w="med" len="med"/>
@@ -4809,23 +4823,7 @@
                     <a:bodyPr/>
                     <a:lstStyle/>
                     <a:p>
-                      <a:pPr marL="0" marR="0" lvl="0" indent="0" algn="ctr" defTabSz="914400" rtl="0" eaLnBrk="1" fontAlgn="auto" latinLnBrk="0" hangingPunct="1">
-                        <a:lnSpc>
-                          <a:spcPct val="100000"/>
-                        </a:lnSpc>
-                        <a:spcBef>
-                          <a:spcPts val="0"/>
-                        </a:spcBef>
-                        <a:spcAft>
-                          <a:spcPts val="0"/>
-                        </a:spcAft>
-                        <a:buClrTx/>
-                        <a:buSzTx/>
-                        <a:buFontTx/>
-                        <a:buNone/>
-                        <a:tabLst/>
-                        <a:defRPr/>
-                      </a:pPr>
+                      <a:pPr algn="ctr"/>
                       <a:r>
                         <a:rPr lang="en-US" sz="1700" b="0" dirty="0">
                           <a:solidFill>
@@ -4834,7 +4832,7 @@
                           <a:latin typeface="Times New Roman" panose="02020603050405020304" pitchFamily="18" charset="0"/>
                           <a:cs typeface="Times New Roman" panose="02020603050405020304" pitchFamily="18" charset="0"/>
                         </a:rPr>
-                        <a:t>1.3588403</a:t>
+                        <a:t>1.5180655</a:t>
                       </a:r>
                     </a:p>
                   </a:txBody>
@@ -4856,16 +4854,16 @@
                       <a:tailEnd type="none" w="med" len="med"/>
                     </a:lnR>
                     <a:lnT w="12700" cap="flat" cmpd="sng" algn="ctr">
-                      <a:noFill/>
-                      <a:prstDash val="solid"/>
-                      <a:round/>
-                      <a:headEnd type="none" w="med" len="med"/>
-                      <a:tailEnd type="none" w="med" len="med"/>
-                    </a:lnT>
-                    <a:lnB w="12700" cap="flat" cmpd="sng" algn="ctr">
                       <a:solidFill>
                         <a:srgbClr val="591D91"/>
                       </a:solidFill>
+                      <a:prstDash val="solid"/>
+                      <a:round/>
+                      <a:headEnd type="none" w="med" len="med"/>
+                      <a:tailEnd type="none" w="med" len="med"/>
+                    </a:lnT>
+                    <a:lnB w="12700" cap="flat" cmpd="sng" algn="ctr">
+                      <a:noFill/>
                       <a:prstDash val="solid"/>
                       <a:round/>
                       <a:headEnd type="none" w="med" len="med"/>
@@ -4920,142 +4918,6 @@
                       <a:tailEnd type="none" w="med" len="med"/>
                     </a:lnL>
                     <a:lnR w="12700" cap="flat" cmpd="sng" algn="ctr">
-                      <a:noFill/>
-                      <a:prstDash val="solid"/>
-                      <a:round/>
-                      <a:headEnd type="none" w="med" len="med"/>
-                      <a:tailEnd type="none" w="med" len="med"/>
-                    </a:lnR>
-                    <a:lnT w="12700" cap="flat" cmpd="sng" algn="ctr">
-                      <a:noFill/>
-                      <a:prstDash val="solid"/>
-                      <a:round/>
-                      <a:headEnd type="none" w="med" len="med"/>
-                      <a:tailEnd type="none" w="med" len="med"/>
-                    </a:lnT>
-                    <a:lnB w="12700" cap="flat" cmpd="sng" algn="ctr">
-                      <a:noFill/>
-                      <a:prstDash val="solid"/>
-                      <a:round/>
-                      <a:headEnd type="none" w="med" len="med"/>
-                      <a:tailEnd type="none" w="med" len="med"/>
-                    </a:lnB>
-                    <a:lnTlToBr w="12700" cmpd="sng">
-                      <a:noFill/>
-                      <a:prstDash val="solid"/>
-                    </a:lnTlToBr>
-                    <a:lnBlToTr w="12700" cmpd="sng">
-                      <a:noFill/>
-                      <a:prstDash val="solid"/>
-                    </a:lnBlToTr>
-                    <a:noFill/>
-                  </a:tcPr>
-                </a:tc>
-                <a:tc>
-                  <a:txBody>
-                    <a:bodyPr/>
-                    <a:lstStyle/>
-                    <a:p>
-                      <a:pPr algn="ctr"/>
-                      <a:r>
-                        <a:rPr lang="en-US" sz="1700" b="0" dirty="0">
-                          <a:solidFill>
-                            <a:schemeClr val="bg1">
-                              <a:lumMod val="75000"/>
-                            </a:schemeClr>
-                          </a:solidFill>
-                          <a:latin typeface="Times New Roman" panose="02020603050405020304" pitchFamily="18" charset="0"/>
-                          <a:cs typeface="Times New Roman" panose="02020603050405020304" pitchFamily="18" charset="0"/>
-                        </a:rPr>
-                        <a:t>1.5744927</a:t>
-                      </a:r>
-                    </a:p>
-                  </a:txBody>
-                  <a:tcPr marL="0" marR="0" marT="0" marB="0" anchor="ctr">
-                    <a:lnL w="12700" cap="flat" cmpd="sng" algn="ctr">
-                      <a:noFill/>
-                      <a:prstDash val="solid"/>
-                      <a:round/>
-                      <a:headEnd type="none" w="med" len="med"/>
-                      <a:tailEnd type="none" w="med" len="med"/>
-                    </a:lnL>
-                    <a:lnR w="12700" cap="flat" cmpd="sng" algn="ctr">
-                      <a:noFill/>
-                      <a:prstDash val="solid"/>
-                      <a:round/>
-                      <a:headEnd type="none" w="med" len="med"/>
-                      <a:tailEnd type="none" w="med" len="med"/>
-                    </a:lnR>
-                    <a:lnT w="12700" cap="flat" cmpd="sng" algn="ctr">
-                      <a:noFill/>
-                      <a:prstDash val="solid"/>
-                      <a:round/>
-                      <a:headEnd type="none" w="med" len="med"/>
-                      <a:tailEnd type="none" w="med" len="med"/>
-                    </a:lnT>
-                    <a:lnB w="12700" cap="flat" cmpd="sng" algn="ctr">
-                      <a:noFill/>
-                      <a:prstDash val="solid"/>
-                      <a:round/>
-                      <a:headEnd type="none" w="med" len="med"/>
-                      <a:tailEnd type="none" w="med" len="med"/>
-                    </a:lnB>
-                    <a:lnTlToBr w="12700" cmpd="sng">
-                      <a:noFill/>
-                      <a:prstDash val="solid"/>
-                    </a:lnTlToBr>
-                    <a:lnBlToTr w="12700" cmpd="sng">
-                      <a:noFill/>
-                      <a:prstDash val="solid"/>
-                    </a:lnBlToTr>
-                    <a:noFill/>
-                  </a:tcPr>
-                </a:tc>
-                <a:tc>
-                  <a:txBody>
-                    <a:bodyPr/>
-                    <a:lstStyle/>
-                    <a:p>
-                      <a:pPr marL="0" marR="0" lvl="0" indent="0" algn="ctr" defTabSz="914400" rtl="0" eaLnBrk="1" fontAlgn="auto" latinLnBrk="0" hangingPunct="1">
-                        <a:lnSpc>
-                          <a:spcPct val="100000"/>
-                        </a:lnSpc>
-                        <a:spcBef>
-                          <a:spcPts val="0"/>
-                        </a:spcBef>
-                        <a:spcAft>
-                          <a:spcPts val="0"/>
-                        </a:spcAft>
-                        <a:buClrTx/>
-                        <a:buSzTx/>
-                        <a:buFontTx/>
-                        <a:buNone/>
-                        <a:tabLst/>
-                        <a:defRPr/>
-                      </a:pPr>
-                      <a:r>
-                        <a:rPr lang="en-US" sz="1700" b="0" dirty="0">
-                          <a:solidFill>
-                            <a:schemeClr val="bg1">
-                              <a:lumMod val="75000"/>
-                            </a:schemeClr>
-                          </a:solidFill>
-                          <a:latin typeface="Times New Roman" panose="02020603050405020304" pitchFamily="18" charset="0"/>
-                          <a:cs typeface="Times New Roman" panose="02020603050405020304" pitchFamily="18" charset="0"/>
-                        </a:rPr>
-                        <a:t>1.5180655</a:t>
-                      </a:r>
-                    </a:p>
-                  </a:txBody>
-                  <a:tcPr marL="0" marR="0" marT="0" marB="0" anchor="ctr">
-                    <a:lnL w="12700" cap="flat" cmpd="sng" algn="ctr">
-                      <a:noFill/>
-                      <a:prstDash val="solid"/>
-                      <a:round/>
-                      <a:headEnd type="none" w="med" len="med"/>
-                      <a:tailEnd type="none" w="med" len="med"/>
-                    </a:lnL>
-                    <a:lnR w="12700" cap="flat" cmpd="sng" algn="ctr">
                       <a:solidFill>
                         <a:srgbClr val="591D91"/>
                       </a:solidFill>
@@ -5065,9 +4927,7 @@
                       <a:tailEnd type="none" w="med" len="med"/>
                     </a:lnR>
                     <a:lnT w="12700" cap="flat" cmpd="sng" algn="ctr">
-                      <a:solidFill>
-                        <a:srgbClr val="591D91"/>
-                      </a:solidFill>
+                      <a:noFill/>
                       <a:prstDash val="solid"/>
                       <a:round/>
                       <a:headEnd type="none" w="med" len="med"/>
@@ -5173,6 +5033,146 @@
                     <a:noFill/>
                   </a:tcPr>
                 </a:tc>
+                <a:tc>
+                  <a:txBody>
+                    <a:bodyPr/>
+                    <a:lstStyle/>
+                    <a:p>
+                      <a:pPr marL="0" marR="0" lvl="0" indent="0" algn="ctr" defTabSz="914400" rtl="0" eaLnBrk="1" fontAlgn="auto" latinLnBrk="0" hangingPunct="1">
+                        <a:lnSpc>
+                          <a:spcPct val="100000"/>
+                        </a:lnSpc>
+                        <a:spcBef>
+                          <a:spcPts val="0"/>
+                        </a:spcBef>
+                        <a:spcAft>
+                          <a:spcPts val="0"/>
+                        </a:spcAft>
+                        <a:buClrTx/>
+                        <a:buSzTx/>
+                        <a:buFontTx/>
+                        <a:buNone/>
+                        <a:tabLst/>
+                        <a:defRPr/>
+                      </a:pPr>
+                      <a:r>
+                        <a:rPr lang="en-US" sz="1700" b="0" dirty="0">
+                          <a:solidFill>
+                            <a:schemeClr val="bg1">
+                              <a:lumMod val="75000"/>
+                            </a:schemeClr>
+                          </a:solidFill>
+                          <a:latin typeface="Times New Roman" panose="02020603050405020304" pitchFamily="18" charset="0"/>
+                          <a:cs typeface="Times New Roman" panose="02020603050405020304" pitchFamily="18" charset="0"/>
+                        </a:rPr>
+                        <a:t>1.5180655</a:t>
+                      </a:r>
+                    </a:p>
+                  </a:txBody>
+                  <a:tcPr marL="0" marR="0" marT="0" marB="0" anchor="ctr">
+                    <a:lnL w="12700" cap="flat" cmpd="sng" algn="ctr">
+                      <a:solidFill>
+                        <a:srgbClr val="591D91"/>
+                      </a:solidFill>
+                      <a:prstDash val="solid"/>
+                      <a:round/>
+                      <a:headEnd type="none" w="med" len="med"/>
+                      <a:tailEnd type="none" w="med" len="med"/>
+                    </a:lnL>
+                    <a:lnR w="12700" cap="flat" cmpd="sng" algn="ctr">
+                      <a:noFill/>
+                      <a:prstDash val="solid"/>
+                      <a:round/>
+                      <a:headEnd type="none" w="med" len="med"/>
+                      <a:tailEnd type="none" w="med" len="med"/>
+                    </a:lnR>
+                    <a:lnT w="12700" cap="flat" cmpd="sng" algn="ctr">
+                      <a:solidFill>
+                        <a:srgbClr val="591D91"/>
+                      </a:solidFill>
+                      <a:prstDash val="solid"/>
+                      <a:round/>
+                      <a:headEnd type="none" w="med" len="med"/>
+                      <a:tailEnd type="none" w="med" len="med"/>
+                    </a:lnT>
+                    <a:lnB w="12700" cap="flat" cmpd="sng" algn="ctr">
+                      <a:noFill/>
+                      <a:prstDash val="solid"/>
+                      <a:round/>
+                      <a:headEnd type="none" w="med" len="med"/>
+                      <a:tailEnd type="none" w="med" len="med"/>
+                    </a:lnB>
+                    <a:lnTlToBr w="12700" cmpd="sng">
+                      <a:noFill/>
+                      <a:prstDash val="solid"/>
+                    </a:lnTlToBr>
+                    <a:lnBlToTr w="12700" cmpd="sng">
+                      <a:noFill/>
+                      <a:prstDash val="solid"/>
+                    </a:lnBlToTr>
+                    <a:noFill/>
+                  </a:tcPr>
+                </a:tc>
+                <a:tc>
+                  <a:txBody>
+                    <a:bodyPr/>
+                    <a:lstStyle/>
+                    <a:p>
+                      <a:pPr algn="ctr"/>
+                      <a:r>
+                        <a:rPr lang="en-US" sz="1700" b="0" dirty="0">
+                          <a:solidFill>
+                            <a:schemeClr val="bg1">
+                              <a:lumMod val="75000"/>
+                            </a:schemeClr>
+                          </a:solidFill>
+                          <a:latin typeface="Times New Roman" panose="02020603050405020304" pitchFamily="18" charset="0"/>
+                          <a:cs typeface="Times New Roman" panose="02020603050405020304" pitchFamily="18" charset="0"/>
+                        </a:rPr>
+                        <a:t>1.5744927</a:t>
+                      </a:r>
+                    </a:p>
+                  </a:txBody>
+                  <a:tcPr marL="0" marR="0" marT="0" marB="0" anchor="ctr">
+                    <a:lnL w="12700" cap="flat" cmpd="sng" algn="ctr">
+                      <a:noFill/>
+                      <a:prstDash val="solid"/>
+                      <a:round/>
+                      <a:headEnd type="none" w="med" len="med"/>
+                      <a:tailEnd type="none" w="med" len="med"/>
+                    </a:lnL>
+                    <a:lnR w="12700" cap="flat" cmpd="sng" algn="ctr">
+                      <a:noFill/>
+                      <a:prstDash val="solid"/>
+                      <a:round/>
+                      <a:headEnd type="none" w="med" len="med"/>
+                      <a:tailEnd type="none" w="med" len="med"/>
+                    </a:lnR>
+                    <a:lnT w="12700" cap="flat" cmpd="sng" algn="ctr">
+                      <a:noFill/>
+                      <a:prstDash val="solid"/>
+                      <a:round/>
+                      <a:headEnd type="none" w="med" len="med"/>
+                      <a:tailEnd type="none" w="med" len="med"/>
+                    </a:lnT>
+                    <a:lnB w="12700" cap="flat" cmpd="sng" algn="ctr">
+                      <a:noFill/>
+                      <a:prstDash val="solid"/>
+                      <a:round/>
+                      <a:headEnd type="none" w="med" len="med"/>
+                      <a:tailEnd type="none" w="med" len="med"/>
+                    </a:lnB>
+                    <a:lnTlToBr w="12700" cmpd="sng">
+                      <a:noFill/>
+                      <a:prstDash val="solid"/>
+                    </a:lnTlToBr>
+                    <a:lnBlToTr w="12700" cmpd="sng">
+                      <a:noFill/>
+                      <a:prstDash val="solid"/>
+                    </a:lnBlToTr>
+                    <a:noFill/>
+                  </a:tcPr>
+                </a:tc>
                 <a:extLst>
                   <a:ext uri="{0D108BD9-81ED-4DB2-BD59-A6C34878D82A}">
                     <a16:rowId xmlns:a16="http://schemas.microsoft.com/office/drawing/2014/main" val="3444286290"/>
@@ -5197,130 +5197,6 @@
                           <a:cs typeface="Times New Roman" panose="02020603050405020304" pitchFamily="18" charset="0"/>
                         </a:rPr>
                         <a:t>5</a:t>
-                      </a:r>
-                    </a:p>
-                  </a:txBody>
-                  <a:tcPr marL="0" marR="0" marT="0" marB="0" anchor="ctr">
-                    <a:lnL w="12700" cap="flat" cmpd="sng" algn="ctr">
-                      <a:noFill/>
-                      <a:prstDash val="solid"/>
-                      <a:round/>
-                      <a:headEnd type="none" w="med" len="med"/>
-                      <a:tailEnd type="none" w="med" len="med"/>
-                    </a:lnL>
-                    <a:lnR w="12700" cap="flat" cmpd="sng" algn="ctr">
-                      <a:noFill/>
-                      <a:prstDash val="solid"/>
-                      <a:round/>
-                      <a:headEnd type="none" w="med" len="med"/>
-                      <a:tailEnd type="none" w="med" len="med"/>
-                    </a:lnR>
-                    <a:lnT w="12700" cap="flat" cmpd="sng" algn="ctr">
-                      <a:noFill/>
-                      <a:prstDash val="solid"/>
-                      <a:round/>
-                      <a:headEnd type="none" w="med" len="med"/>
-                      <a:tailEnd type="none" w="med" len="med"/>
-                    </a:lnT>
-                    <a:lnB w="28575" cap="flat" cmpd="sng" algn="ctr">
-                      <a:noFill/>
-                      <a:prstDash val="solid"/>
-                      <a:round/>
-                      <a:headEnd type="none" w="med" len="med"/>
-                      <a:tailEnd type="none" w="med" len="med"/>
-                    </a:lnB>
-                    <a:lnTlToBr w="12700" cmpd="sng">
-                      <a:noFill/>
-                      <a:prstDash val="solid"/>
-                    </a:lnTlToBr>
-                    <a:lnBlToTr w="12700" cmpd="sng">
-                      <a:noFill/>
-                      <a:prstDash val="solid"/>
-                    </a:lnBlToTr>
-                    <a:solidFill>
-                      <a:srgbClr val="F7F7F7"/>
-                    </a:solidFill>
-                  </a:tcPr>
-                </a:tc>
-                <a:tc>
-                  <a:txBody>
-                    <a:bodyPr/>
-                    <a:lstStyle/>
-                    <a:p>
-                      <a:pPr algn="ctr"/>
-                      <a:r>
-                        <a:rPr lang="en-US" sz="1700" b="0" dirty="0">
-                          <a:solidFill>
-                            <a:schemeClr val="bg1">
-                              <a:lumMod val="75000"/>
-                            </a:schemeClr>
-                          </a:solidFill>
-                          <a:latin typeface="Times New Roman" panose="02020603050405020304" pitchFamily="18" charset="0"/>
-                          <a:cs typeface="Times New Roman" panose="02020603050405020304" pitchFamily="18" charset="0"/>
-                        </a:rPr>
-                        <a:t>1.1567937</a:t>
-                      </a:r>
-                    </a:p>
-                  </a:txBody>
-                  <a:tcPr marL="0" marR="0" marT="0" marB="0" anchor="ctr">
-                    <a:lnL w="12700" cap="flat" cmpd="sng" algn="ctr">
-                      <a:noFill/>
-                      <a:prstDash val="solid"/>
-                      <a:round/>
-                      <a:headEnd type="none" w="med" len="med"/>
-                      <a:tailEnd type="none" w="med" len="med"/>
-                    </a:lnL>
-                    <a:lnR w="12700" cap="flat" cmpd="sng" algn="ctr">
-                      <a:noFill/>
-                      <a:prstDash val="solid"/>
-                      <a:round/>
-                      <a:headEnd type="none" w="med" len="med"/>
-                      <a:tailEnd type="none" w="med" len="med"/>
-                    </a:lnR>
-                    <a:lnT w="12700" cap="flat" cmpd="sng" algn="ctr">
-                      <a:noFill/>
-                      <a:prstDash val="solid"/>
-                      <a:round/>
-                      <a:headEnd type="none" w="med" len="med"/>
-                      <a:tailEnd type="none" w="med" len="med"/>
-                    </a:lnT>
-                    <a:lnB w="28575" cap="flat" cmpd="sng" algn="ctr">
-                      <a:noFill/>
-                      <a:prstDash val="solid"/>
-                      <a:round/>
-                      <a:headEnd type="none" w="med" len="med"/>
-                      <a:tailEnd type="none" w="med" len="med"/>
-                    </a:lnB>
-                    <a:lnTlToBr w="12700" cmpd="sng">
-                      <a:noFill/>
-                      <a:prstDash val="solid"/>
-                    </a:lnTlToBr>
-                    <a:lnBlToTr w="12700" cmpd="sng">
-                      <a:noFill/>
-                      <a:prstDash val="solid"/>
-                    </a:lnBlToTr>
-                    <a:solidFill>
-                      <a:srgbClr val="F7F7F7"/>
-                    </a:solidFill>
-                  </a:tcPr>
-                </a:tc>
-                <a:tc>
-                  <a:txBody>
-                    <a:bodyPr/>
-                    <a:lstStyle/>
-                    <a:p>
-                      <a:pPr algn="ctr"/>
-                      <a:r>
-                        <a:rPr lang="en-US" sz="1700" b="0" dirty="0">
-                          <a:solidFill>
-                            <a:schemeClr val="bg1">
-                              <a:lumMod val="75000"/>
-                            </a:schemeClr>
-                          </a:solidFill>
-                          <a:latin typeface="Times New Roman" panose="02020603050405020304" pitchFamily="18" charset="0"/>
-                          <a:cs typeface="Times New Roman" panose="02020603050405020304" pitchFamily="18" charset="0"/>
-                        </a:rPr>
-                        <a:t>1.5744927</a:t>
                       </a:r>
                     </a:p>
                   </a:txBody>
@@ -5426,6 +5302,130 @@
                       <a:headEnd type="none" w="med" len="med"/>
                       <a:tailEnd type="none" w="med" len="med"/>
                     </a:lnT>
+                    <a:lnB w="28575" cap="flat" cmpd="sng" algn="ctr">
+                      <a:noFill/>
+                      <a:prstDash val="solid"/>
+                      <a:round/>
+                      <a:headEnd type="none" w="med" len="med"/>
+                      <a:tailEnd type="none" w="med" len="med"/>
+                    </a:lnB>
+                    <a:lnTlToBr w="12700" cmpd="sng">
+                      <a:noFill/>
+                      <a:prstDash val="solid"/>
+                    </a:lnTlToBr>
+                    <a:lnBlToTr w="12700" cmpd="sng">
+                      <a:noFill/>
+                      <a:prstDash val="solid"/>
+                    </a:lnBlToTr>
+                    <a:solidFill>
+                      <a:srgbClr val="F7F7F7"/>
+                    </a:solidFill>
+                  </a:tcPr>
+                </a:tc>
+                <a:tc>
+                  <a:txBody>
+                    <a:bodyPr/>
+                    <a:lstStyle/>
+                    <a:p>
+                      <a:pPr algn="ctr"/>
+                      <a:r>
+                        <a:rPr lang="en-US" sz="1700" b="0" dirty="0">
+                          <a:solidFill>
+                            <a:schemeClr val="bg1">
+                              <a:lumMod val="75000"/>
+                            </a:schemeClr>
+                          </a:solidFill>
+                          <a:latin typeface="Times New Roman" panose="02020603050405020304" pitchFamily="18" charset="0"/>
+                          <a:cs typeface="Times New Roman" panose="02020603050405020304" pitchFamily="18" charset="0"/>
+                        </a:rPr>
+                        <a:t>1.5744927</a:t>
+                      </a:r>
+                    </a:p>
+                  </a:txBody>
+                  <a:tcPr marL="0" marR="0" marT="0" marB="0" anchor="ctr">
+                    <a:lnL w="12700" cap="flat" cmpd="sng" algn="ctr">
+                      <a:noFill/>
+                      <a:prstDash val="solid"/>
+                      <a:round/>
+                      <a:headEnd type="none" w="med" len="med"/>
+                      <a:tailEnd type="none" w="med" len="med"/>
+                    </a:lnL>
+                    <a:lnR w="12700" cap="flat" cmpd="sng" algn="ctr">
+                      <a:noFill/>
+                      <a:prstDash val="solid"/>
+                      <a:round/>
+                      <a:headEnd type="none" w="med" len="med"/>
+                      <a:tailEnd type="none" w="med" len="med"/>
+                    </a:lnR>
+                    <a:lnT w="12700" cap="flat" cmpd="sng" algn="ctr">
+                      <a:noFill/>
+                      <a:prstDash val="solid"/>
+                      <a:round/>
+                      <a:headEnd type="none" w="med" len="med"/>
+                      <a:tailEnd type="none" w="med" len="med"/>
+                    </a:lnT>
+                    <a:lnB w="28575" cap="flat" cmpd="sng" algn="ctr">
+                      <a:noFill/>
+                      <a:prstDash val="solid"/>
+                      <a:round/>
+                      <a:headEnd type="none" w="med" len="med"/>
+                      <a:tailEnd type="none" w="med" len="med"/>
+                    </a:lnB>
+                    <a:lnTlToBr w="12700" cmpd="sng">
+                      <a:noFill/>
+                      <a:prstDash val="solid"/>
+                    </a:lnTlToBr>
+                    <a:lnBlToTr w="12700" cmpd="sng">
+                      <a:noFill/>
+                      <a:prstDash val="solid"/>
+                    </a:lnBlToTr>
+                    <a:solidFill>
+                      <a:srgbClr val="F7F7F7"/>
+                    </a:solidFill>
+                  </a:tcPr>
+                </a:tc>
+                <a:tc>
+                  <a:txBody>
+                    <a:bodyPr/>
+                    <a:lstStyle/>
+                    <a:p>
+                      <a:pPr algn="ctr"/>
+                      <a:r>
+                        <a:rPr lang="en-US" sz="1700" b="0" dirty="0">
+                          <a:solidFill>
+                            <a:schemeClr val="bg1">
+                              <a:lumMod val="75000"/>
+                            </a:schemeClr>
+                          </a:solidFill>
+                          <a:latin typeface="Times New Roman" panose="02020603050405020304" pitchFamily="18" charset="0"/>
+                          <a:cs typeface="Times New Roman" panose="02020603050405020304" pitchFamily="18" charset="0"/>
+                        </a:rPr>
+                        <a:t>…</a:t>
+                      </a:r>
+                    </a:p>
+                  </a:txBody>
+                  <a:tcPr marL="0" marR="0" marT="0" marB="0" anchor="ctr">
+                    <a:lnL w="12700" cap="flat" cmpd="sng" algn="ctr">
+                      <a:noFill/>
+                      <a:prstDash val="solid"/>
+                      <a:round/>
+                      <a:headEnd type="none" w="med" len="med"/>
+                      <a:tailEnd type="none" w="med" len="med"/>
+                    </a:lnL>
+                    <a:lnR w="12700" cap="flat" cmpd="sng" algn="ctr">
+                      <a:noFill/>
+                      <a:prstDash val="solid"/>
+                      <a:round/>
+                      <a:headEnd type="none" w="med" len="med"/>
+                      <a:tailEnd type="none" w="med" len="med"/>
+                    </a:lnR>
+                    <a:lnT w="12700" cap="flat" cmpd="sng" algn="ctr">
+                      <a:noFill/>
+                      <a:prstDash val="solid"/>
+                      <a:round/>
+                      <a:headEnd type="none" w="med" len="med"/>
+                      <a:tailEnd type="none" w="med" len="med"/>
+                    </a:lnT>
                     <a:lnB w="12700" cap="flat" cmpd="sng" algn="ctr">
                       <a:noFill/>
                       <a:prstDash val="solid"/>
@@ -5728,11 +5728,7 @@
             <a:graphicFrameLocks noGrp="1"/>
           </p:cNvGraphicFramePr>
           <p:nvPr>
-            <p:extLst>
-              <p:ext uri="{D42A27DB-BD31-4B8C-83A1-F6EECF244321}">
-                <p14:modId xmlns:p14="http://schemas.microsoft.com/office/powerpoint/2010/main" val="2657047555"/>
-              </p:ext>
-            </p:extLst>
+            <p:extLst/>
           </p:nvPr>
         </p:nvGraphicFramePr>
         <p:xfrm>
@@ -7551,7 +7547,7 @@
                           <a:latin typeface="Times New Roman" panose="02020603050405020304" pitchFamily="18" charset="0"/>
                           <a:cs typeface="Times New Roman" panose="02020603050405020304" pitchFamily="18" charset="0"/>
                         </a:rPr>
-                        <a:t>0.22760318</a:t>
+                        <a:t>0.00000000</a:t>
                       </a:r>
                     </a:p>
                   </a:txBody>
@@ -8110,7 +8106,7 @@
     </p:spTree>
     <p:extLst>
       <p:ext uri="{BB962C8B-B14F-4D97-AF65-F5344CB8AC3E}">
-        <p14:creationId xmlns:p14="http://schemas.microsoft.com/office/powerpoint/2010/main" val="3121708270"/>
+        <p14:creationId xmlns:p14="http://schemas.microsoft.com/office/powerpoint/2010/main" val="3694937945"/>
       </p:ext>
     </p:extLst>
   </p:cSld>

</xml_diff>